<commit_message>
Second round ... still a lot to do
</commit_message>
<xml_diff>
--- a/Presentations/ADBIS 2016/ADBIS-2016-Presentation.pptx
+++ b/Presentations/ADBIS 2016/ADBIS-2016-Presentation.pptx
@@ -1156,14 +1156,14 @@
   </dgm:ptLst>
   <dgm:cxnLst>
     <dgm:cxn modelId="{92E7095D-C9FE-463D-B758-D5D01403CEF4}" srcId="{1C27179A-B331-4063-8E4D-5BF3DE3F2FB9}" destId="{8CE23EDF-E271-4EFF-B4C1-D92625DAB3EB}" srcOrd="2" destOrd="0" parTransId="{048FFB7D-8966-41F8-89EC-24C26A12EEB8}" sibTransId="{F36A5E62-CBFC-4204-9CEA-99EE2EB5B181}"/>
+    <dgm:cxn modelId="{ED421F1B-C79A-497A-B1B8-A0F44A4144EC}" srcId="{1C27179A-B331-4063-8E4D-5BF3DE3F2FB9}" destId="{7F78409F-6F65-46D2-9491-AECB0D068A59}" srcOrd="1" destOrd="0" parTransId="{618D3CCF-B519-4FDB-96F9-08562240BBC3}" sibTransId="{6EDAD98C-8CF5-4D81-86AB-333B6DD66BA6}"/>
+    <dgm:cxn modelId="{1EFAF3D2-4C58-4929-80A1-87D8171E9751}" type="presOf" srcId="{7F78409F-6F65-46D2-9491-AECB0D068A59}" destId="{68878238-6498-4F0A-98B1-7F1664E51CA1}" srcOrd="0" destOrd="0" presId="urn:microsoft.com/office/officeart/2005/8/layout/hProcess9"/>
+    <dgm:cxn modelId="{B85EFC76-D397-47A5-B85C-FB91C11FB260}" srcId="{1C27179A-B331-4063-8E4D-5BF3DE3F2FB9}" destId="{BBF886E0-F955-4847-AF26-4D1264BDD6CC}" srcOrd="3" destOrd="0" parTransId="{5DEC8684-76A0-45F7-9E26-B7A16588251B}" sibTransId="{1BCF054B-9F9D-450D-B6E6-D00F9E448C9B}"/>
+    <dgm:cxn modelId="{B7D27A27-30AE-47D0-AF27-2C221AFEC87D}" type="presOf" srcId="{1C27179A-B331-4063-8E4D-5BF3DE3F2FB9}" destId="{0C1B951D-CDB7-4387-B69F-9D4DEE917BF7}" srcOrd="0" destOrd="0" presId="urn:microsoft.com/office/officeart/2005/8/layout/hProcess9"/>
+    <dgm:cxn modelId="{235C53F0-165B-47C3-8A68-3C99DDEA9E8F}" type="presOf" srcId="{213205CA-5F5A-43E0-B466-E2276DE533E8}" destId="{F8FE8FDF-136F-4861-AEF3-1C1260B2FD6A}" srcOrd="0" destOrd="0" presId="urn:microsoft.com/office/officeart/2005/8/layout/hProcess9"/>
+    <dgm:cxn modelId="{236D9EF0-EDE9-47CD-BA12-E5680743E28C}" srcId="{1C27179A-B331-4063-8E4D-5BF3DE3F2FB9}" destId="{213205CA-5F5A-43E0-B466-E2276DE533E8}" srcOrd="0" destOrd="0" parTransId="{C5007E1B-A697-4505-B981-9D5F864EDFD3}" sibTransId="{D64622F2-8E4B-46B2-944B-C8313CBC2557}"/>
+    <dgm:cxn modelId="{002E7251-3B00-4118-A070-F35B5C836C5E}" type="presOf" srcId="{8CE23EDF-E271-4EFF-B4C1-D92625DAB3EB}" destId="{2219BF18-5D0B-4DD4-9280-B46D394648E3}" srcOrd="0" destOrd="0" presId="urn:microsoft.com/office/officeart/2005/8/layout/hProcess9"/>
     <dgm:cxn modelId="{28079BA8-3F4D-41E9-88C7-320B4E748DE7}" type="presOf" srcId="{BBF886E0-F955-4847-AF26-4D1264BDD6CC}" destId="{D78D8B81-CE07-4532-8898-B25A913A8764}" srcOrd="0" destOrd="0" presId="urn:microsoft.com/office/officeart/2005/8/layout/hProcess9"/>
-    <dgm:cxn modelId="{ED421F1B-C79A-497A-B1B8-A0F44A4144EC}" srcId="{1C27179A-B331-4063-8E4D-5BF3DE3F2FB9}" destId="{7F78409F-6F65-46D2-9491-AECB0D068A59}" srcOrd="1" destOrd="0" parTransId="{618D3CCF-B519-4FDB-96F9-08562240BBC3}" sibTransId="{6EDAD98C-8CF5-4D81-86AB-333B6DD66BA6}"/>
-    <dgm:cxn modelId="{235C53F0-165B-47C3-8A68-3C99DDEA9E8F}" type="presOf" srcId="{213205CA-5F5A-43E0-B466-E2276DE533E8}" destId="{F8FE8FDF-136F-4861-AEF3-1C1260B2FD6A}" srcOrd="0" destOrd="0" presId="urn:microsoft.com/office/officeart/2005/8/layout/hProcess9"/>
-    <dgm:cxn modelId="{002E7251-3B00-4118-A070-F35B5C836C5E}" type="presOf" srcId="{8CE23EDF-E271-4EFF-B4C1-D92625DAB3EB}" destId="{2219BF18-5D0B-4DD4-9280-B46D394648E3}" srcOrd="0" destOrd="0" presId="urn:microsoft.com/office/officeart/2005/8/layout/hProcess9"/>
-    <dgm:cxn modelId="{B7D27A27-30AE-47D0-AF27-2C221AFEC87D}" type="presOf" srcId="{1C27179A-B331-4063-8E4D-5BF3DE3F2FB9}" destId="{0C1B951D-CDB7-4387-B69F-9D4DEE917BF7}" srcOrd="0" destOrd="0" presId="urn:microsoft.com/office/officeart/2005/8/layout/hProcess9"/>
-    <dgm:cxn modelId="{B85EFC76-D397-47A5-B85C-FB91C11FB260}" srcId="{1C27179A-B331-4063-8E4D-5BF3DE3F2FB9}" destId="{BBF886E0-F955-4847-AF26-4D1264BDD6CC}" srcOrd="3" destOrd="0" parTransId="{5DEC8684-76A0-45F7-9E26-B7A16588251B}" sibTransId="{1BCF054B-9F9D-450D-B6E6-D00F9E448C9B}"/>
-    <dgm:cxn modelId="{236D9EF0-EDE9-47CD-BA12-E5680743E28C}" srcId="{1C27179A-B331-4063-8E4D-5BF3DE3F2FB9}" destId="{213205CA-5F5A-43E0-B466-E2276DE533E8}" srcOrd="0" destOrd="0" parTransId="{C5007E1B-A697-4505-B981-9D5F864EDFD3}" sibTransId="{D64622F2-8E4B-46B2-944B-C8313CBC2557}"/>
-    <dgm:cxn modelId="{1EFAF3D2-4C58-4929-80A1-87D8171E9751}" type="presOf" srcId="{7F78409F-6F65-46D2-9491-AECB0D068A59}" destId="{68878238-6498-4F0A-98B1-7F1664E51CA1}" srcOrd="0" destOrd="0" presId="urn:microsoft.com/office/officeart/2005/8/layout/hProcess9"/>
     <dgm:cxn modelId="{43D50C7A-60C4-4106-B2FC-182C71F62710}" type="presParOf" srcId="{0C1B951D-CDB7-4387-B69F-9D4DEE917BF7}" destId="{0CFF12C4-C7F7-4C17-AA46-69DF8C18014F}" srcOrd="0" destOrd="0" presId="urn:microsoft.com/office/officeart/2005/8/layout/hProcess9"/>
     <dgm:cxn modelId="{0936FDFC-CFB9-43DE-81F8-ED1229F78D3E}" type="presParOf" srcId="{0C1B951D-CDB7-4387-B69F-9D4DEE917BF7}" destId="{703DE698-22A5-4624-B68C-CB0577FB6556}" srcOrd="1" destOrd="0" presId="urn:microsoft.com/office/officeart/2005/8/layout/hProcess9"/>
     <dgm:cxn modelId="{B45EA4CE-1110-4A61-86E5-BC5458329701}" type="presParOf" srcId="{703DE698-22A5-4624-B68C-CB0577FB6556}" destId="{F8FE8FDF-136F-4861-AEF3-1C1260B2FD6A}" srcOrd="0" destOrd="0" presId="urn:microsoft.com/office/officeart/2005/8/layout/hProcess9"/>
@@ -2814,7 +2814,7 @@
           <a:p>
             <a:fld id="{652FA383-9D4B-AD42-9BF3-88FCA749BE0E}" type="datetimeFigureOut">
               <a:rPr lang="en-US" smtClean="0"/>
-              <a:t>7/27/2016</a:t>
+              <a:t>8/6/16</a:t>
             </a:fld>
             <a:endParaRPr lang="pt-BR"/>
           </a:p>
@@ -2880,7 +2880,7 @@
           <a:p>
             <a:fld id="{9A622828-1E86-1441-9A56-10C9EB14358D}" type="slidenum">
               <a:rPr lang="pt-BR" smtClean="0"/>
-              <a:t>‹nº›</a:t>
+              <a:t>‹#›</a:t>
             </a:fld>
             <a:endParaRPr lang="pt-BR"/>
           </a:p>
@@ -2979,7 +2979,7 @@
           <a:p>
             <a:fld id="{C888862E-4053-6841-80C1-EE02861216A5}" type="datetimeFigureOut">
               <a:rPr lang="en-US" smtClean="0"/>
-              <a:t>7/27/2016</a:t>
+              <a:t>8/6/16</a:t>
             </a:fld>
             <a:endParaRPr lang="pt-BR"/>
           </a:p>
@@ -3138,7 +3138,7 @@
           <a:p>
             <a:fld id="{E6F8DC79-C430-E548-A754-84842F9135C3}" type="slidenum">
               <a:rPr lang="pt-BR" smtClean="0"/>
-              <a:t>‹nº›</a:t>
+              <a:t>‹#›</a:t>
             </a:fld>
             <a:endParaRPr lang="pt-BR"/>
           </a:p>
@@ -13028,7 +13028,7 @@
           <a:p>
             <a:fld id="{68C2560D-EC28-3B41-86E8-18F1CE0113B4}" type="datetimeFigureOut">
               <a:rPr lang="en-US" smtClean="0"/>
-              <a:t>7/27/2016</a:t>
+              <a:t>8/6/16</a:t>
             </a:fld>
             <a:endParaRPr lang="en-US"/>
           </a:p>
@@ -13070,7 +13070,7 @@
           <a:p>
             <a:fld id="{2066355A-084C-D24E-9AD2-7E4FC41EA627}" type="slidenum">
               <a:rPr lang="en-US" smtClean="0"/>
-              <a:t>‹nº›</a:t>
+              <a:t>‹#›</a:t>
             </a:fld>
             <a:endParaRPr lang="en-US"/>
           </a:p>
@@ -13236,7 +13236,7 @@
           <a:p>
             <a:fld id="{68C2560D-EC28-3B41-86E8-18F1CE0113B4}" type="datetimeFigureOut">
               <a:rPr lang="en-US" smtClean="0"/>
-              <a:t>7/27/2016</a:t>
+              <a:t>8/6/16</a:t>
             </a:fld>
             <a:endParaRPr lang="en-US"/>
           </a:p>
@@ -13278,7 +13278,7 @@
           <a:p>
             <a:fld id="{2066355A-084C-D24E-9AD2-7E4FC41EA627}" type="slidenum">
               <a:rPr lang="en-US" smtClean="0"/>
-              <a:t>‹nº›</a:t>
+              <a:t>‹#›</a:t>
             </a:fld>
             <a:endParaRPr lang="en-US"/>
           </a:p>
@@ -13492,7 +13492,7 @@
           <a:p>
             <a:fld id="{68C2560D-EC28-3B41-86E8-18F1CE0113B4}" type="datetimeFigureOut">
               <a:rPr lang="en-US" smtClean="0"/>
-              <a:t>7/27/2016</a:t>
+              <a:t>8/6/16</a:t>
             </a:fld>
             <a:endParaRPr lang="en-US"/>
           </a:p>
@@ -13534,7 +13534,7 @@
           <a:p>
             <a:fld id="{2066355A-084C-D24E-9AD2-7E4FC41EA627}" type="slidenum">
               <a:rPr lang="en-US" smtClean="0"/>
-              <a:t>‹nº›</a:t>
+              <a:t>‹#›</a:t>
             </a:fld>
             <a:endParaRPr lang="en-US"/>
           </a:p>
@@ -13666,7 +13666,7 @@
           <a:p>
             <a:fld id="{68C2560D-EC28-3B41-86E8-18F1CE0113B4}" type="datetimeFigureOut">
               <a:rPr lang="en-US" smtClean="0"/>
-              <a:t>7/27/2016</a:t>
+              <a:t>8/6/16</a:t>
             </a:fld>
             <a:endParaRPr lang="en-US"/>
           </a:p>
@@ -13708,7 +13708,7 @@
           <a:p>
             <a:fld id="{2066355A-084C-D24E-9AD2-7E4FC41EA627}" type="slidenum">
               <a:rPr lang="en-US" smtClean="0"/>
-              <a:t>‹nº›</a:t>
+              <a:t>‹#›</a:t>
             </a:fld>
             <a:endParaRPr lang="en-US"/>
           </a:p>
@@ -14009,7 +14009,7 @@
           <a:p>
             <a:fld id="{68C2560D-EC28-3B41-86E8-18F1CE0113B4}" type="datetimeFigureOut">
               <a:rPr lang="en-US" smtClean="0"/>
-              <a:t>7/27/2016</a:t>
+              <a:t>8/6/16</a:t>
             </a:fld>
             <a:endParaRPr lang="en-US"/>
           </a:p>
@@ -14051,7 +14051,7 @@
           <a:p>
             <a:fld id="{2066355A-084C-D24E-9AD2-7E4FC41EA627}" type="slidenum">
               <a:rPr lang="en-US" smtClean="0"/>
-              <a:t>‹nº›</a:t>
+              <a:t>‹#›</a:t>
             </a:fld>
             <a:endParaRPr lang="en-US"/>
           </a:p>
@@ -14284,7 +14284,7 @@
           <a:p>
             <a:fld id="{68C2560D-EC28-3B41-86E8-18F1CE0113B4}" type="datetimeFigureOut">
               <a:rPr lang="en-US" smtClean="0"/>
-              <a:t>7/27/2016</a:t>
+              <a:t>8/6/16</a:t>
             </a:fld>
             <a:endParaRPr lang="en-US"/>
           </a:p>
@@ -14326,7 +14326,7 @@
           <a:p>
             <a:fld id="{2066355A-084C-D24E-9AD2-7E4FC41EA627}" type="slidenum">
               <a:rPr lang="en-US" smtClean="0"/>
-              <a:t>‹nº›</a:t>
+              <a:t>‹#›</a:t>
             </a:fld>
             <a:endParaRPr lang="en-US"/>
           </a:p>
@@ -14663,7 +14663,7 @@
           <a:p>
             <a:fld id="{68C2560D-EC28-3B41-86E8-18F1CE0113B4}" type="datetimeFigureOut">
               <a:rPr lang="en-US" smtClean="0"/>
-              <a:t>7/27/2016</a:t>
+              <a:t>8/6/16</a:t>
             </a:fld>
             <a:endParaRPr lang="en-US"/>
           </a:p>
@@ -14705,7 +14705,7 @@
           <a:p>
             <a:fld id="{2066355A-084C-D24E-9AD2-7E4FC41EA627}" type="slidenum">
               <a:rPr lang="en-US" smtClean="0"/>
-              <a:t>‹nº›</a:t>
+              <a:t>‹#›</a:t>
             </a:fld>
             <a:endParaRPr lang="en-US"/>
           </a:p>
@@ -14781,7 +14781,7 @@
           <a:p>
             <a:fld id="{68C2560D-EC28-3B41-86E8-18F1CE0113B4}" type="datetimeFigureOut">
               <a:rPr lang="en-US" smtClean="0"/>
-              <a:t>7/27/2016</a:t>
+              <a:t>8/6/16</a:t>
             </a:fld>
             <a:endParaRPr lang="en-US"/>
           </a:p>
@@ -14823,7 +14823,7 @@
           <a:p>
             <a:fld id="{2066355A-084C-D24E-9AD2-7E4FC41EA627}" type="slidenum">
               <a:rPr lang="en-US" smtClean="0"/>
-              <a:t>‹nº›</a:t>
+              <a:t>‹#›</a:t>
             </a:fld>
             <a:endParaRPr lang="en-US"/>
           </a:p>
@@ -14952,7 +14952,7 @@
           <a:p>
             <a:fld id="{68C2560D-EC28-3B41-86E8-18F1CE0113B4}" type="datetimeFigureOut">
               <a:rPr lang="en-US" smtClean="0"/>
-              <a:t>7/27/2016</a:t>
+              <a:t>8/6/16</a:t>
             </a:fld>
             <a:endParaRPr lang="en-US"/>
           </a:p>
@@ -15002,7 +15002,7 @@
           <a:p>
             <a:fld id="{2066355A-084C-D24E-9AD2-7E4FC41EA627}" type="slidenum">
               <a:rPr lang="en-US" smtClean="0"/>
-              <a:t>‹nº›</a:t>
+              <a:t>‹#›</a:t>
             </a:fld>
             <a:endParaRPr lang="en-US"/>
           </a:p>
@@ -15306,7 +15306,7 @@
           <a:p>
             <a:fld id="{68C2560D-EC28-3B41-86E8-18F1CE0113B4}" type="datetimeFigureOut">
               <a:rPr lang="en-US" smtClean="0"/>
-              <a:t>7/27/2016</a:t>
+              <a:t>8/6/16</a:t>
             </a:fld>
             <a:endParaRPr lang="en-US"/>
           </a:p>
@@ -15369,7 +15369,7 @@
           <a:p>
             <a:fld id="{2066355A-084C-D24E-9AD2-7E4FC41EA627}" type="slidenum">
               <a:rPr lang="en-US" smtClean="0"/>
-              <a:t>‹nº›</a:t>
+              <a:t>‹#›</a:t>
             </a:fld>
             <a:endParaRPr lang="en-US"/>
           </a:p>
@@ -15688,7 +15688,7 @@
           <a:p>
             <a:fld id="{68C2560D-EC28-3B41-86E8-18F1CE0113B4}" type="datetimeFigureOut">
               <a:rPr lang="en-US" smtClean="0"/>
-              <a:t>7/27/2016</a:t>
+              <a:t>8/6/16</a:t>
             </a:fld>
             <a:endParaRPr lang="en-US"/>
           </a:p>
@@ -15730,7 +15730,7 @@
           <a:p>
             <a:fld id="{2066355A-084C-D24E-9AD2-7E4FC41EA627}" type="slidenum">
               <a:rPr lang="en-US" smtClean="0"/>
-              <a:t>‹nº›</a:t>
+              <a:t>‹#›</a:t>
             </a:fld>
             <a:endParaRPr lang="en-US"/>
           </a:p>
@@ -15975,7 +15975,7 @@
           <a:p>
             <a:fld id="{68C2560D-EC28-3B41-86E8-18F1CE0113B4}" type="datetimeFigureOut">
               <a:rPr lang="en-US" smtClean="0"/>
-              <a:t>7/27/2016</a:t>
+              <a:t>8/6/16</a:t>
             </a:fld>
             <a:endParaRPr lang="en-US"/>
           </a:p>
@@ -16049,7 +16049,7 @@
           <a:p>
             <a:fld id="{2066355A-084C-D24E-9AD2-7E4FC41EA627}" type="slidenum">
               <a:rPr lang="en-US" smtClean="0"/>
-              <a:t>‹nº›</a:t>
+              <a:t>‹#›</a:t>
             </a:fld>
             <a:endParaRPr lang="en-US"/>
           </a:p>
@@ -18469,13 +18469,6 @@
               </a:rPr>
               <a:t>; regions!)</a:t>
             </a:r>
-            <a:endParaRPr lang="en-US" sz="800" dirty="0" smtClean="0">
-              <a:solidFill>
-                <a:schemeClr val="bg2">
-                  <a:lumMod val="50000"/>
-                </a:schemeClr>
-              </a:solidFill>
-            </a:endParaRPr>
           </a:p>
         </p:txBody>
       </p:sp>
@@ -19825,6 +19818,31 @@
       </p:grpSpPr>
       <p:sp>
         <p:nvSpPr>
+          <p:cNvPr id="2" name="Titre 1"/>
+          <p:cNvSpPr>
+            <a:spLocks noGrp="1"/>
+          </p:cNvSpPr>
+          <p:nvPr>
+            <p:ph type="title"/>
+          </p:nvPr>
+        </p:nvSpPr>
+        <p:spPr/>
+        <p:txBody>
+          <a:bodyPr>
+            <a:normAutofit/>
+          </a:bodyPr>
+          <a:lstStyle/>
+          <a:p>
+            <a:r>
+              <a:rPr lang="en-GB" b="1" dirty="0" smtClean="0"/>
+              <a:t>Abstract service matching</a:t>
+            </a:r>
+            <a:endParaRPr lang="en-GB" dirty="0"/>
+          </a:p>
+        </p:txBody>
+      </p:sp>
+      <p:sp>
+        <p:nvSpPr>
           <p:cNvPr id="3" name="Espace réservé du numéro de diapositive 2"/>
           <p:cNvSpPr>
             <a:spLocks noGrp="1"/>
@@ -19833,12 +19851,7 @@
             <p:ph type="sldNum" sz="quarter" idx="12"/>
           </p:nvPr>
         </p:nvSpPr>
-        <p:spPr>
-          <a:xfrm>
-            <a:off x="7028371" y="3712230"/>
-            <a:ext cx="984019" cy="273844"/>
-          </a:xfrm>
-        </p:spPr>
+        <p:spPr/>
         <p:txBody>
           <a:bodyPr/>
           <a:lstStyle/>
@@ -19896,10 +19909,6 @@
             </a:lvl1pPr>
           </a:lstStyle>
           <a:p>
-            <a:r>
-              <a:rPr lang="en-GB" sz="2000" b="1" dirty="0" smtClean="0"/>
-              <a:t>Rhone Service-Based Query Rewriting Algorithm</a:t>
-            </a:r>
             <a:endParaRPr lang="en-GB" sz="2000" b="1" dirty="0"/>
           </a:p>
         </p:txBody>
@@ -21671,58 +21680,6 @@
           </a:fontRef>
         </p:style>
       </p:cxnSp>
-      <p:sp>
-        <p:nvSpPr>
-          <p:cNvPr id="49" name="Titre 4"/>
-          <p:cNvSpPr txBox="1">
-            <a:spLocks/>
-          </p:cNvSpPr>
-          <p:nvPr/>
-        </p:nvSpPr>
-        <p:spPr>
-          <a:xfrm>
-            <a:off x="299188" y="905308"/>
-            <a:ext cx="7543800" cy="375371"/>
-          </a:xfrm>
-          <a:prstGeom prst="rect">
-            <a:avLst/>
-          </a:prstGeom>
-        </p:spPr>
-        <p:txBody>
-          <a:bodyPr vert="horz" lIns="91440" tIns="45720" rIns="91440" bIns="45720" rtlCol="0" anchor="b">
-            <a:normAutofit/>
-          </a:bodyPr>
-          <a:lstStyle>
-            <a:lvl1pPr algn="l" defTabSz="685800" rtl="0" eaLnBrk="1" latinLnBrk="0" hangingPunct="1">
-              <a:lnSpc>
-                <a:spcPct val="85000"/>
-              </a:lnSpc>
-              <a:spcBef>
-                <a:spcPct val="0"/>
-              </a:spcBef>
-              <a:buNone/>
-              <a:defRPr sz="3600" kern="1200" spc="-38" baseline="0">
-                <a:solidFill>
-                  <a:schemeClr val="tx1">
-                    <a:lumMod val="75000"/>
-                    <a:lumOff val="25000"/>
-                  </a:schemeClr>
-                </a:solidFill>
-                <a:latin typeface="+mj-lt"/>
-                <a:ea typeface="+mj-ea"/>
-                <a:cs typeface="+mj-cs"/>
-              </a:defRPr>
-            </a:lvl1pPr>
-          </a:lstStyle>
-          <a:p>
-            <a:r>
-              <a:rPr lang="en-GB" sz="1600" b="1" dirty="0" smtClean="0"/>
-              <a:t>1) Abstract service matching</a:t>
-            </a:r>
-            <a:endParaRPr lang="en-GB" sz="1600" b="1" dirty="0"/>
-          </a:p>
-        </p:txBody>
-      </p:sp>
       <p:cxnSp>
         <p:nvCxnSpPr>
           <p:cNvPr id="51" name="Conector reto 50"/>
@@ -21955,7 +21912,7 @@
                                           </p:stCondLst>
                                         </p:cTn>
                                         <p:tgtEl>
-                                          <p:spTgt spid="49"/>
+                                          <p:spTgt spid="17"/>
                                         </p:tgtEl>
                                         <p:attrNameLst>
                                           <p:attrName>style.visibility</p:attrName>
@@ -21969,59 +21926,6 @@
                                       <p:cBhvr>
                                         <p:cTn id="21" dur="500"/>
                                         <p:tgtEl>
-                                          <p:spTgt spid="49"/>
-                                        </p:tgtEl>
-                                      </p:cBhvr>
-                                    </p:animEffect>
-                                  </p:childTnLst>
-                                </p:cTn>
-                              </p:par>
-                            </p:childTnLst>
-                          </p:cTn>
-                        </p:par>
-                      </p:childTnLst>
-                    </p:cTn>
-                  </p:par>
-                  <p:par>
-                    <p:cTn id="22" fill="hold">
-                      <p:stCondLst>
-                        <p:cond delay="indefinite"/>
-                      </p:stCondLst>
-                      <p:childTnLst>
-                        <p:par>
-                          <p:cTn id="23" fill="hold">
-                            <p:stCondLst>
-                              <p:cond delay="0"/>
-                            </p:stCondLst>
-                            <p:childTnLst>
-                              <p:par>
-                                <p:cTn id="24" presetID="10" presetClass="entr" presetSubtype="0" fill="hold" grpId="0" nodeType="clickEffect">
-                                  <p:stCondLst>
-                                    <p:cond delay="0"/>
-                                  </p:stCondLst>
-                                  <p:childTnLst>
-                                    <p:set>
-                                      <p:cBhvr>
-                                        <p:cTn id="25" dur="1" fill="hold">
-                                          <p:stCondLst>
-                                            <p:cond delay="0"/>
-                                          </p:stCondLst>
-                                        </p:cTn>
-                                        <p:tgtEl>
-                                          <p:spTgt spid="17"/>
-                                        </p:tgtEl>
-                                        <p:attrNameLst>
-                                          <p:attrName>style.visibility</p:attrName>
-                                        </p:attrNameLst>
-                                      </p:cBhvr>
-                                      <p:to>
-                                        <p:strVal val="visible"/>
-                                      </p:to>
-                                    </p:set>
-                                    <p:animEffect transition="in" filter="fade">
-                                      <p:cBhvr>
-                                        <p:cTn id="26" dur="500"/>
-                                        <p:tgtEl>
                                           <p:spTgt spid="17"/>
                                         </p:tgtEl>
                                       </p:cBhvr>
@@ -22030,14 +21934,14 @@
                                 </p:cTn>
                               </p:par>
                               <p:par>
-                                <p:cTn id="27" presetID="10" presetClass="entr" presetSubtype="0" fill="hold" nodeType="withEffect">
+                                <p:cTn id="22" presetID="10" presetClass="entr" presetSubtype="0" fill="hold" nodeType="withEffect">
                                   <p:stCondLst>
                                     <p:cond delay="0"/>
                                   </p:stCondLst>
                                   <p:childTnLst>
                                     <p:set>
                                       <p:cBhvr>
-                                        <p:cTn id="28" dur="1" fill="hold">
+                                        <p:cTn id="23" dur="1" fill="hold">
                                           <p:stCondLst>
                                             <p:cond delay="0"/>
                                           </p:stCondLst>
@@ -22055,7 +21959,7 @@
                                     </p:set>
                                     <p:animEffect transition="in" filter="fade">
                                       <p:cBhvr>
-                                        <p:cTn id="29" dur="500"/>
+                                        <p:cTn id="24" dur="500"/>
                                         <p:tgtEl>
                                           <p:spTgt spid="30"/>
                                         </p:tgtEl>
@@ -22065,14 +21969,14 @@
                                 </p:cTn>
                               </p:par>
                               <p:par>
-                                <p:cTn id="30" presetID="10" presetClass="entr" presetSubtype="0" fill="hold" nodeType="withEffect">
+                                <p:cTn id="25" presetID="10" presetClass="entr" presetSubtype="0" fill="hold" nodeType="withEffect">
                                   <p:stCondLst>
                                     <p:cond delay="0"/>
                                   </p:stCondLst>
                                   <p:childTnLst>
                                     <p:set>
                                       <p:cBhvr>
-                                        <p:cTn id="31" dur="1" fill="hold">
+                                        <p:cTn id="26" dur="1" fill="hold">
                                           <p:stCondLst>
                                             <p:cond delay="0"/>
                                           </p:stCondLst>
@@ -22090,7 +21994,7 @@
                                     </p:set>
                                     <p:animEffect transition="in" filter="fade">
                                       <p:cBhvr>
-                                        <p:cTn id="32" dur="500"/>
+                                        <p:cTn id="27" dur="500"/>
                                         <p:tgtEl>
                                           <p:spTgt spid="23"/>
                                         </p:tgtEl>
@@ -22100,14 +22004,14 @@
                                 </p:cTn>
                               </p:par>
                               <p:par>
-                                <p:cTn id="33" presetID="10" presetClass="entr" presetSubtype="0" fill="hold" nodeType="withEffect">
+                                <p:cTn id="28" presetID="10" presetClass="entr" presetSubtype="0" fill="hold" nodeType="withEffect">
                                   <p:stCondLst>
                                     <p:cond delay="0"/>
                                   </p:stCondLst>
                                   <p:childTnLst>
                                     <p:set>
                                       <p:cBhvr>
-                                        <p:cTn id="34" dur="1" fill="hold">
+                                        <p:cTn id="29" dur="1" fill="hold">
                                           <p:stCondLst>
                                             <p:cond delay="0"/>
                                           </p:stCondLst>
@@ -22125,7 +22029,7 @@
                                     </p:set>
                                     <p:animEffect transition="in" filter="fade">
                                       <p:cBhvr>
-                                        <p:cTn id="35" dur="500"/>
+                                        <p:cTn id="30" dur="500"/>
                                         <p:tgtEl>
                                           <p:spTgt spid="21"/>
                                         </p:tgtEl>
@@ -22135,14 +22039,14 @@
                                 </p:cTn>
                               </p:par>
                               <p:par>
-                                <p:cTn id="36" presetID="10" presetClass="entr" presetSubtype="0" fill="hold" nodeType="withEffect">
+                                <p:cTn id="31" presetID="10" presetClass="entr" presetSubtype="0" fill="hold" nodeType="withEffect">
                                   <p:stCondLst>
                                     <p:cond delay="0"/>
                                   </p:stCondLst>
                                   <p:childTnLst>
                                     <p:set>
                                       <p:cBhvr>
-                                        <p:cTn id="37" dur="1" fill="hold">
+                                        <p:cTn id="32" dur="1" fill="hold">
                                           <p:stCondLst>
                                             <p:cond delay="0"/>
                                           </p:stCondLst>
@@ -22160,7 +22064,7 @@
                                     </p:set>
                                     <p:animEffect transition="in" filter="fade">
                                       <p:cBhvr>
-                                        <p:cTn id="38" dur="500"/>
+                                        <p:cTn id="33" dur="500"/>
                                         <p:tgtEl>
                                           <p:spTgt spid="19"/>
                                         </p:tgtEl>
@@ -22176,26 +22080,26 @@
                     </p:cTn>
                   </p:par>
                   <p:par>
-                    <p:cTn id="39" fill="hold">
+                    <p:cTn id="34" fill="hold">
                       <p:stCondLst>
                         <p:cond delay="indefinite"/>
                       </p:stCondLst>
                       <p:childTnLst>
                         <p:par>
-                          <p:cTn id="40" fill="hold">
+                          <p:cTn id="35" fill="hold">
                             <p:stCondLst>
                               <p:cond delay="0"/>
                             </p:stCondLst>
                             <p:childTnLst>
                               <p:par>
-                                <p:cTn id="41" presetID="10" presetClass="entr" presetSubtype="0" fill="hold" grpId="0" nodeType="clickEffect">
+                                <p:cTn id="36" presetID="10" presetClass="entr" presetSubtype="0" fill="hold" grpId="0" nodeType="clickEffect">
                                   <p:stCondLst>
                                     <p:cond delay="0"/>
                                   </p:stCondLst>
                                   <p:childTnLst>
                                     <p:set>
                                       <p:cBhvr>
-                                        <p:cTn id="42" dur="1" fill="hold">
+                                        <p:cTn id="37" dur="1" fill="hold">
                                           <p:stCondLst>
                                             <p:cond delay="0"/>
                                           </p:stCondLst>
@@ -22213,7 +22117,7 @@
                                     </p:set>
                                     <p:animEffect transition="in" filter="fade">
                                       <p:cBhvr>
-                                        <p:cTn id="43" dur="500"/>
+                                        <p:cTn id="38" dur="500"/>
                                         <p:tgtEl>
                                           <p:spTgt spid="31"/>
                                         </p:tgtEl>
@@ -22223,14 +22127,14 @@
                                 </p:cTn>
                               </p:par>
                               <p:par>
-                                <p:cTn id="44" presetID="10" presetClass="entr" presetSubtype="0" fill="hold" nodeType="withEffect">
+                                <p:cTn id="39" presetID="10" presetClass="entr" presetSubtype="0" fill="hold" nodeType="withEffect">
                                   <p:stCondLst>
                                     <p:cond delay="0"/>
                                   </p:stCondLst>
                                   <p:childTnLst>
                                     <p:set>
                                       <p:cBhvr>
-                                        <p:cTn id="45" dur="1" fill="hold">
+                                        <p:cTn id="40" dur="1" fill="hold">
                                           <p:stCondLst>
                                             <p:cond delay="0"/>
                                           </p:stCondLst>
@@ -22248,7 +22152,7 @@
                                     </p:set>
                                     <p:animEffect transition="in" filter="fade">
                                       <p:cBhvr>
-                                        <p:cTn id="46" dur="500"/>
+                                        <p:cTn id="41" dur="500"/>
                                         <p:tgtEl>
                                           <p:spTgt spid="41"/>
                                         </p:tgtEl>
@@ -22258,14 +22162,14 @@
                                 </p:cTn>
                               </p:par>
                               <p:par>
-                                <p:cTn id="47" presetID="10" presetClass="entr" presetSubtype="0" fill="hold" nodeType="withEffect">
+                                <p:cTn id="42" presetID="10" presetClass="entr" presetSubtype="0" fill="hold" nodeType="withEffect">
                                   <p:stCondLst>
                                     <p:cond delay="0"/>
                                   </p:stCondLst>
                                   <p:childTnLst>
                                     <p:set>
                                       <p:cBhvr>
-                                        <p:cTn id="48" dur="1" fill="hold">
+                                        <p:cTn id="43" dur="1" fill="hold">
                                           <p:stCondLst>
                                             <p:cond delay="0"/>
                                           </p:stCondLst>
@@ -22283,7 +22187,7 @@
                                     </p:set>
                                     <p:animEffect transition="in" filter="fade">
                                       <p:cBhvr>
-                                        <p:cTn id="49" dur="500"/>
+                                        <p:cTn id="44" dur="500"/>
                                         <p:tgtEl>
                                           <p:spTgt spid="33"/>
                                         </p:tgtEl>
@@ -22299,26 +22203,26 @@
                     </p:cTn>
                   </p:par>
                   <p:par>
-                    <p:cTn id="50" fill="hold">
+                    <p:cTn id="45" fill="hold">
                       <p:stCondLst>
                         <p:cond delay="indefinite"/>
                       </p:stCondLst>
                       <p:childTnLst>
                         <p:par>
-                          <p:cTn id="51" fill="hold">
+                          <p:cTn id="46" fill="hold">
                             <p:stCondLst>
                               <p:cond delay="0"/>
                             </p:stCondLst>
                             <p:childTnLst>
                               <p:par>
-                                <p:cTn id="52" presetID="10" presetClass="entr" presetSubtype="0" fill="hold" grpId="0" nodeType="clickEffect">
+                                <p:cTn id="47" presetID="10" presetClass="entr" presetSubtype="0" fill="hold" grpId="0" nodeType="clickEffect">
                                   <p:stCondLst>
                                     <p:cond delay="0"/>
                                   </p:stCondLst>
                                   <p:childTnLst>
                                     <p:set>
                                       <p:cBhvr>
-                                        <p:cTn id="53" dur="1" fill="hold">
+                                        <p:cTn id="48" dur="1" fill="hold">
                                           <p:stCondLst>
                                             <p:cond delay="0"/>
                                           </p:stCondLst>
@@ -22336,7 +22240,7 @@
                                     </p:set>
                                     <p:animEffect transition="in" filter="fade">
                                       <p:cBhvr>
-                                        <p:cTn id="54" dur="500"/>
+                                        <p:cTn id="49" dur="500"/>
                                         <p:tgtEl>
                                           <p:spTgt spid="43"/>
                                         </p:tgtEl>
@@ -22346,14 +22250,14 @@
                                 </p:cTn>
                               </p:par>
                               <p:par>
-                                <p:cTn id="55" presetID="10" presetClass="entr" presetSubtype="0" fill="hold" nodeType="withEffect">
+                                <p:cTn id="50" presetID="10" presetClass="entr" presetSubtype="0" fill="hold" nodeType="withEffect">
                                   <p:stCondLst>
                                     <p:cond delay="0"/>
                                   </p:stCondLst>
                                   <p:childTnLst>
                                     <p:set>
                                       <p:cBhvr>
-                                        <p:cTn id="56" dur="1" fill="hold">
+                                        <p:cTn id="51" dur="1" fill="hold">
                                           <p:stCondLst>
                                             <p:cond delay="0"/>
                                           </p:stCondLst>
@@ -22371,7 +22275,7 @@
                                     </p:set>
                                     <p:animEffect transition="in" filter="fade">
                                       <p:cBhvr>
-                                        <p:cTn id="57" dur="500"/>
+                                        <p:cTn id="52" dur="500"/>
                                         <p:tgtEl>
                                           <p:spTgt spid="47"/>
                                         </p:tgtEl>
@@ -22381,14 +22285,14 @@
                                 </p:cTn>
                               </p:par>
                               <p:par>
-                                <p:cTn id="58" presetID="10" presetClass="entr" presetSubtype="0" fill="hold" nodeType="withEffect">
+                                <p:cTn id="53" presetID="10" presetClass="entr" presetSubtype="0" fill="hold" nodeType="withEffect">
                                   <p:stCondLst>
                                     <p:cond delay="0"/>
                                   </p:stCondLst>
                                   <p:childTnLst>
                                     <p:set>
                                       <p:cBhvr>
-                                        <p:cTn id="59" dur="1" fill="hold">
+                                        <p:cTn id="54" dur="1" fill="hold">
                                           <p:stCondLst>
                                             <p:cond delay="0"/>
                                           </p:stCondLst>
@@ -22406,7 +22310,7 @@
                                     </p:set>
                                     <p:animEffect transition="in" filter="fade">
                                       <p:cBhvr>
-                                        <p:cTn id="60" dur="500"/>
+                                        <p:cTn id="55" dur="500"/>
                                         <p:tgtEl>
                                           <p:spTgt spid="45"/>
                                         </p:tgtEl>
@@ -22422,26 +22326,26 @@
                     </p:cTn>
                   </p:par>
                   <p:par>
-                    <p:cTn id="61" fill="hold">
+                    <p:cTn id="56" fill="hold">
                       <p:stCondLst>
                         <p:cond delay="indefinite"/>
                       </p:stCondLst>
                       <p:childTnLst>
                         <p:par>
-                          <p:cTn id="62" fill="hold">
+                          <p:cTn id="57" fill="hold">
                             <p:stCondLst>
                               <p:cond delay="0"/>
                             </p:stCondLst>
                             <p:childTnLst>
                               <p:par>
-                                <p:cTn id="63" presetID="10" presetClass="entr" presetSubtype="0" fill="hold" nodeType="clickEffect">
+                                <p:cTn id="58" presetID="10" presetClass="entr" presetSubtype="0" fill="hold" nodeType="clickEffect">
                                   <p:stCondLst>
                                     <p:cond delay="0"/>
                                   </p:stCondLst>
                                   <p:childTnLst>
                                     <p:set>
                                       <p:cBhvr>
-                                        <p:cTn id="64" dur="1" fill="hold">
+                                        <p:cTn id="59" dur="1" fill="hold">
                                           <p:stCondLst>
                                             <p:cond delay="0"/>
                                           </p:stCondLst>
@@ -22459,7 +22363,7 @@
                                     </p:set>
                                     <p:animEffect transition="in" filter="fade">
                                       <p:cBhvr>
-                                        <p:cTn id="65" dur="500"/>
+                                        <p:cTn id="60" dur="500"/>
                                         <p:tgtEl>
                                           <p:spTgt spid="51"/>
                                         </p:tgtEl>
@@ -22503,7 +22407,6 @@
       <p:bldP spid="17" grpId="0" animBg="1"/>
       <p:bldP spid="31" grpId="0" animBg="1"/>
       <p:bldP spid="43" grpId="0" animBg="1"/>
-      <p:bldP spid="49" grpId="0"/>
     </p:bldLst>
   </p:timing>
 </p:sld>
@@ -26535,7 +26438,7 @@
         </p:spPr>
         <p:txBody>
           <a:bodyPr vert="horz" lIns="91440" tIns="45720" rIns="91440" bIns="45720" rtlCol="0" anchor="b">
-            <a:normAutofit fontScale="92500"/>
+            <a:normAutofit fontScale="85000" lnSpcReduction="10000"/>
           </a:bodyPr>
           <a:lstStyle>
             <a:lvl1pPr algn="l" defTabSz="685800" rtl="0" eaLnBrk="1" latinLnBrk="0" hangingPunct="1">
@@ -31155,11 +31058,6 @@
               </a:rPr>
               <a:t>the intersection of all abstract services in each CSD on p is empty. It means that is forbidden to have abstract services replicated among the set p</a:t>
             </a:r>
-            <a:endParaRPr lang="en-US" sz="1200" dirty="0" smtClean="0">
-              <a:solidFill>
-                <a:schemeClr val="tx1"/>
-              </a:solidFill>
-            </a:endParaRPr>
           </a:p>
         </p:txBody>
       </p:sp>
@@ -37333,7 +37231,7 @@
         </p:nvSpPr>
         <p:spPr>
           <a:xfrm>
-            <a:off x="1143000" y="3326666"/>
+            <a:off x="822960" y="3134387"/>
             <a:ext cx="6858000" cy="1320383"/>
           </a:xfrm>
           <a:prstGeom prst="rect">
@@ -37385,7 +37283,7 @@
         </p:nvSpPr>
         <p:spPr>
           <a:xfrm>
-            <a:off x="239070" y="3597873"/>
+            <a:off x="626134" y="2347511"/>
             <a:ext cx="8328991" cy="1857663"/>
           </a:xfrm>
           <a:prstGeom prst="rect">
@@ -41759,6 +41657,105 @@
           </a:fontRef>
         </p:style>
       </p:cxnSp>
+      <p:sp>
+        <p:nvSpPr>
+          <p:cNvPr id="2" name="Rectangle 1"/>
+          <p:cNvSpPr/>
+          <p:nvPr/>
+        </p:nvSpPr>
+        <p:spPr>
+          <a:xfrm>
+            <a:off x="0" y="1818777"/>
+            <a:ext cx="9144000" cy="1846924"/>
+          </a:xfrm>
+          <a:prstGeom prst="rect">
+            <a:avLst/>
+          </a:prstGeom>
+          <a:solidFill>
+            <a:schemeClr val="accent5">
+              <a:lumMod val="50000"/>
+            </a:schemeClr>
+          </a:solidFill>
+        </p:spPr>
+        <p:style>
+          <a:lnRef idx="2">
+            <a:schemeClr val="accent1">
+              <a:shade val="50000"/>
+            </a:schemeClr>
+          </a:lnRef>
+          <a:fillRef idx="1">
+            <a:schemeClr val="accent1"/>
+          </a:fillRef>
+          <a:effectRef idx="0">
+            <a:schemeClr val="accent1"/>
+          </a:effectRef>
+          <a:fontRef idx="minor">
+            <a:schemeClr val="lt1"/>
+          </a:fontRef>
+        </p:style>
+        <p:txBody>
+          <a:bodyPr rtlCol="0" anchor="ctr"/>
+          <a:lstStyle/>
+          <a:p>
+            <a:pPr algn="ctr"/>
+            <a:r>
+              <a:rPr lang="en-GB" dirty="0" smtClean="0"/>
+              <a:t>We need a real example. Tell a story. So services cannot be named data provider 1,2 ,3. </a:t>
+            </a:r>
+          </a:p>
+          <a:p>
+            <a:pPr marL="285750" indent="-285750" algn="ctr">
+              <a:buFontTx/>
+              <a:buChar char="-"/>
+            </a:pPr>
+            <a:r>
+              <a:rPr lang="en-GB" dirty="0" smtClean="0"/>
+              <a:t>Change names into meaningful ones</a:t>
+            </a:r>
+          </a:p>
+          <a:p>
+            <a:pPr marL="285750" indent="-285750" algn="ctr">
+              <a:buFontTx/>
+              <a:buChar char="-"/>
+            </a:pPr>
+            <a:r>
+              <a:rPr lang="en-GB" dirty="0" smtClean="0"/>
+              <a:t>Divide de slide into several so that you can have decent font sizes and that you can introduce all concepts</a:t>
+            </a:r>
+          </a:p>
+          <a:p>
+            <a:pPr marL="742950" lvl="1" indent="-285750" algn="ctr">
+              <a:buFontTx/>
+              <a:buChar char="-"/>
+            </a:pPr>
+            <a:r>
+              <a:rPr lang="en-GB" dirty="0" smtClean="0"/>
+              <a:t>One slide for introducing the context with data providers with SLA (abstract) </a:t>
+            </a:r>
+          </a:p>
+          <a:p>
+            <a:pPr marL="742950" lvl="1" indent="-285750" algn="ctr">
+              <a:buFontTx/>
+              <a:buChar char="-"/>
+            </a:pPr>
+            <a:r>
+              <a:rPr lang="en-GB" dirty="0" smtClean="0"/>
+              <a:t>One slide to introduce query and consumer with preferences</a:t>
+            </a:r>
+          </a:p>
+          <a:p>
+            <a:pPr marL="742950" lvl="1" indent="-285750" algn="ctr">
+              <a:buFontTx/>
+              <a:buChar char="-"/>
+            </a:pPr>
+            <a:r>
+              <a:rPr lang="en-GB" dirty="0" smtClean="0"/>
+              <a:t>One slide to introduce concrete data providers with SLA</a:t>
+            </a:r>
+            <a:endParaRPr lang="en-GB" dirty="0"/>
+          </a:p>
+        </p:txBody>
+      </p:sp>
     </p:spTree>
     <p:extLst>
       <p:ext uri="{BB962C8B-B14F-4D97-AF65-F5344CB8AC3E}">
@@ -41769,11 +41766,11 @@
   <p:clrMapOvr>
     <a:masterClrMapping/>
   </p:clrMapOvr>
-  <mc:AlternateContent xmlns:mc="http://schemas.openxmlformats.org/markup-compatibility/2006">
-    <mc:Choice xmlns:p14="http://schemas.microsoft.com/office/powerpoint/2010/main" Requires="p14">
+  <mc:AlternateContent xmlns:mc="http://schemas.openxmlformats.org/markup-compatibility/2006" xmlns:p14="http://schemas.microsoft.com/office/powerpoint/2010/main">
+    <mc:Choice Requires="p14">
       <p:transition spd="slow" p14:dur="2000"/>
     </mc:Choice>
-    <mc:Fallback>
+    <mc:Fallback xmlns="">
       <p:transition spd="slow"/>
     </mc:Fallback>
   </mc:AlternateContent>
@@ -44159,11 +44156,6 @@
               </a:rPr>
               <a:t>requirements</a:t>
             </a:r>
-            <a:endParaRPr lang="en-US" dirty="0" smtClean="0">
-              <a:solidFill>
-                <a:schemeClr val="tx1"/>
-              </a:solidFill>
-            </a:endParaRPr>
           </a:p>
         </p:txBody>
       </p:sp>
@@ -44934,11 +44926,11 @@
   <p:clrMapOvr>
     <a:masterClrMapping/>
   </p:clrMapOvr>
-  <mc:AlternateContent xmlns:mc="http://schemas.openxmlformats.org/markup-compatibility/2006">
-    <mc:Choice xmlns:p14="http://schemas.microsoft.com/office/powerpoint/2010/main" Requires="p14">
+  <mc:AlternateContent xmlns:mc="http://schemas.openxmlformats.org/markup-compatibility/2006" xmlns:p14="http://schemas.microsoft.com/office/powerpoint/2010/main">
+    <mc:Choice Requires="p14">
       <p:transition spd="slow" p14:dur="2000"/>
     </mc:Choice>
-    <mc:Fallback>
+    <mc:Fallback xmlns="">
       <p:transition spd="slow"/>
     </mc:Fallback>
   </mc:AlternateContent>

</xml_diff>